<commit_message>
Added texture system & converter & shaders
- Changed renderfile shader format (for textures)
- Added texture manager & texture system to shader translator
- Added closure shaders (effect, diffuse) & texture shader
- Updated shader compiler to not compile every time
- Added texture converter tool
- Added glTF mesh loading (untested)
- Updated various classes accordingly
- Updated renderfile documentation accordingly
- Updated status presentation
</commit_message>
<xml_diff>
--- a/doc/Status.pptx
+++ b/doc/Status.pptx
@@ -307,7 +307,7 @@
             <a:fld id="{B61BEF0D-F0BB-DE4B-95CE-6DB70DBA9567}" type="datetimeFigureOut">
               <a:rPr lang="en-US" dirty="0"/>
               <a:pPr/>
-              <a:t>6/17/2020</a:t>
+              <a:t>7/7/2020</a:t>
             </a:fld>
             <a:endParaRPr lang="en-US" dirty="0"/>
           </a:p>
@@ -740,7 +740,7 @@
             <a:fld id="{B61BEF0D-F0BB-DE4B-95CE-6DB70DBA9567}" type="datetimeFigureOut">
               <a:rPr lang="en-US" dirty="0"/>
               <a:pPr/>
-              <a:t>6/17/2020</a:t>
+              <a:t>7/7/2020</a:t>
             </a:fld>
             <a:endParaRPr lang="en-US" dirty="0"/>
           </a:p>
@@ -987,7 +987,7 @@
             <a:fld id="{B61BEF0D-F0BB-DE4B-95CE-6DB70DBA9567}" type="datetimeFigureOut">
               <a:rPr lang="en-US" dirty="0"/>
               <a:pPr/>
-              <a:t>6/17/2020</a:t>
+              <a:t>7/7/2020</a:t>
             </a:fld>
             <a:endParaRPr lang="en-US" dirty="0"/>
           </a:p>
@@ -1292,7 +1292,7 @@
             <a:fld id="{B61BEF0D-F0BB-DE4B-95CE-6DB70DBA9567}" type="datetimeFigureOut">
               <a:rPr lang="en-US" dirty="0"/>
               <a:pPr/>
-              <a:t>6/17/2020</a:t>
+              <a:t>7/7/2020</a:t>
             </a:fld>
             <a:endParaRPr lang="en-US" dirty="0"/>
           </a:p>
@@ -1607,7 +1607,7 @@
             <a:fld id="{B61BEF0D-F0BB-DE4B-95CE-6DB70DBA9567}" type="datetimeFigureOut">
               <a:rPr lang="en-US" dirty="0"/>
               <a:pPr/>
-              <a:t>6/17/2020</a:t>
+              <a:t>7/7/2020</a:t>
             </a:fld>
             <a:endParaRPr lang="en-US" dirty="0"/>
           </a:p>
@@ -1906,7 +1906,7 @@
             <a:fld id="{B61BEF0D-F0BB-DE4B-95CE-6DB70DBA9567}" type="datetimeFigureOut">
               <a:rPr lang="en-US" dirty="0"/>
               <a:pPr/>
-              <a:t>6/17/2020</a:t>
+              <a:t>7/7/2020</a:t>
             </a:fld>
             <a:endParaRPr lang="en-US" dirty="0"/>
           </a:p>
@@ -2270,7 +2270,7 @@
             <a:fld id="{B61BEF0D-F0BB-DE4B-95CE-6DB70DBA9567}" type="datetimeFigureOut">
               <a:rPr lang="en-US" dirty="0"/>
               <a:pPr/>
-              <a:t>6/17/2020</a:t>
+              <a:t>7/7/2020</a:t>
             </a:fld>
             <a:endParaRPr lang="en-US" dirty="0"/>
           </a:p>
@@ -2441,7 +2441,7 @@
             <a:fld id="{B61BEF0D-F0BB-DE4B-95CE-6DB70DBA9567}" type="datetimeFigureOut">
               <a:rPr lang="en-US" dirty="0"/>
               <a:pPr/>
-              <a:t>6/17/2020</a:t>
+              <a:t>7/7/2020</a:t>
             </a:fld>
             <a:endParaRPr lang="en-US" dirty="0"/>
           </a:p>
@@ -2618,7 +2618,7 @@
             <a:fld id="{B61BEF0D-F0BB-DE4B-95CE-6DB70DBA9567}" type="datetimeFigureOut">
               <a:rPr lang="en-US" dirty="0"/>
               <a:pPr/>
-              <a:t>6/17/2020</a:t>
+              <a:t>7/7/2020</a:t>
             </a:fld>
             <a:endParaRPr lang="en-US" dirty="0"/>
           </a:p>
@@ -2785,7 +2785,7 @@
             <a:fld id="{B61BEF0D-F0BB-DE4B-95CE-6DB70DBA9567}" type="datetimeFigureOut">
               <a:rPr lang="en-US" dirty="0"/>
               <a:pPr/>
-              <a:t>6/17/2020</a:t>
+              <a:t>7/7/2020</a:t>
             </a:fld>
             <a:endParaRPr lang="en-US" dirty="0"/>
           </a:p>
@@ -3032,7 +3032,7 @@
             <a:fld id="{B61BEF0D-F0BB-DE4B-95CE-6DB70DBA9567}" type="datetimeFigureOut">
               <a:rPr lang="en-US" dirty="0"/>
               <a:pPr/>
-              <a:t>6/17/2020</a:t>
+              <a:t>7/7/2020</a:t>
             </a:fld>
             <a:endParaRPr lang="en-US" dirty="0"/>
           </a:p>
@@ -3265,7 +3265,7 @@
             <a:fld id="{B61BEF0D-F0BB-DE4B-95CE-6DB70DBA9567}" type="datetimeFigureOut">
               <a:rPr lang="en-US" dirty="0"/>
               <a:pPr/>
-              <a:t>6/17/2020</a:t>
+              <a:t>7/7/2020</a:t>
             </a:fld>
             <a:endParaRPr lang="en-US" dirty="0"/>
           </a:p>
@@ -3644,7 +3644,7 @@
             <a:fld id="{B61BEF0D-F0BB-DE4B-95CE-6DB70DBA9567}" type="datetimeFigureOut">
               <a:rPr lang="en-US" dirty="0"/>
               <a:pPr/>
-              <a:t>6/17/2020</a:t>
+              <a:t>7/7/2020</a:t>
             </a:fld>
             <a:endParaRPr lang="en-US" dirty="0"/>
           </a:p>
@@ -3759,7 +3759,7 @@
             <a:fld id="{B61BEF0D-F0BB-DE4B-95CE-6DB70DBA9567}" type="datetimeFigureOut">
               <a:rPr lang="en-US" dirty="0"/>
               <a:pPr/>
-              <a:t>6/17/2020</a:t>
+              <a:t>7/7/2020</a:t>
             </a:fld>
             <a:endParaRPr lang="en-US" dirty="0"/>
           </a:p>
@@ -3851,7 +3851,7 @@
             <a:fld id="{B61BEF0D-F0BB-DE4B-95CE-6DB70DBA9567}" type="datetimeFigureOut">
               <a:rPr lang="en-US" dirty="0"/>
               <a:pPr/>
-              <a:t>6/17/2020</a:t>
+              <a:t>7/7/2020</a:t>
             </a:fld>
             <a:endParaRPr lang="en-US" dirty="0"/>
           </a:p>
@@ -4103,7 +4103,7 @@
             <a:fld id="{B61BEF0D-F0BB-DE4B-95CE-6DB70DBA9567}" type="datetimeFigureOut">
               <a:rPr lang="en-US" dirty="0"/>
               <a:pPr/>
-              <a:t>6/17/2020</a:t>
+              <a:t>7/7/2020</a:t>
             </a:fld>
             <a:endParaRPr lang="en-US" dirty="0"/>
           </a:p>
@@ -4383,7 +4383,7 @@
             <a:fld id="{B61BEF0D-F0BB-DE4B-95CE-6DB70DBA9567}" type="datetimeFigureOut">
               <a:rPr lang="en-US" dirty="0"/>
               <a:pPr/>
-              <a:t>6/17/2020</a:t>
+              <a:t>7/7/2020</a:t>
             </a:fld>
             <a:endParaRPr lang="en-US" dirty="0"/>
           </a:p>
@@ -4786,7 +4786,7 @@
             <a:fld id="{B61BEF0D-F0BB-DE4B-95CE-6DB70DBA9567}" type="datetimeFigureOut">
               <a:rPr lang="en-US" dirty="0"/>
               <a:pPr/>
-              <a:t>6/17/2020</a:t>
+              <a:t>7/7/2020</a:t>
             </a:fld>
             <a:endParaRPr lang="en-US" dirty="0"/>
           </a:p>
@@ -5407,7 +5407,7 @@
           <a:p>
             <a:r>
               <a:rPr lang="en-US" dirty="0"/>
-              <a:t>Blender &amp; Appleseed</a:t>
+              <a:t>Blender &amp; Python Module</a:t>
             </a:r>
             <a:endParaRPr lang="de-DE" dirty="0"/>
           </a:p>
@@ -5734,7 +5734,7 @@
         </p:spPr>
         <p:txBody>
           <a:bodyPr>
-            <a:normAutofit fontScale="85000" lnSpcReduction="20000"/>
+            <a:normAutofit fontScale="62500" lnSpcReduction="20000"/>
           </a:bodyPr>
           <a:lstStyle/>
           <a:p>
@@ -5742,18 +5742,13 @@
               <a:buNone/>
             </a:pPr>
             <a:r>
-              <a:rPr lang="en-US" b="1">
+              <a:rPr lang="en-US" b="1" dirty="0">
                 <a:solidFill>
                   <a:schemeClr val="tx1"/>
                 </a:solidFill>
               </a:rPr>
               <a:t>COMPLETE</a:t>
             </a:r>
-            <a:endParaRPr lang="en-US" b="1" dirty="0">
-              <a:solidFill>
-                <a:schemeClr val="tx1"/>
-              </a:solidFill>
-            </a:endParaRPr>
           </a:p>
           <a:p>
             <a:r>
@@ -5816,7 +5811,7 @@
                   <a:schemeClr val="tx1"/>
                 </a:solidFill>
               </a:rPr>
-              <a:t>Overhauled &amp; improved backend architecture</a:t>
+              <a:t>Overhauled &amp; improved architecture</a:t>
             </a:r>
           </a:p>
           <a:p>
@@ -5859,7 +5854,30 @@
                   <a:schemeClr val="tx1"/>
                 </a:solidFill>
               </a:rPr>
-              <a:t>Improvement of debugging runtime performance</a:t>
+              <a:t>Big improvements to debugging runtime performance</a:t>
+            </a:r>
+          </a:p>
+          <a:p>
+            <a:pPr marL="0" indent="0">
+              <a:buNone/>
+            </a:pPr>
+            <a:r>
+              <a:rPr lang="en-US" b="1" dirty="0">
+                <a:solidFill>
+                  <a:schemeClr val="tx1"/>
+                </a:solidFill>
+              </a:rPr>
+              <a:t>TODO</a:t>
+            </a:r>
+          </a:p>
+          <a:p>
+            <a:r>
+              <a:rPr lang="en-US" dirty="0">
+                <a:solidFill>
+                  <a:schemeClr val="tx1"/>
+                </a:solidFill>
+              </a:rPr>
+              <a:t>Nothing</a:t>
             </a:r>
           </a:p>
         </p:txBody>
@@ -5984,7 +6002,7 @@
           <a:p>
             <a:r>
               <a:rPr lang="en-US" dirty="0"/>
-              <a:t>Blender &amp; Appleseed</a:t>
+              <a:t>Appleseed &amp; Rendering</a:t>
             </a:r>
             <a:endParaRPr lang="de-DE" dirty="0"/>
           </a:p>
@@ -6311,7 +6329,7 @@
         </p:spPr>
         <p:txBody>
           <a:bodyPr>
-            <a:normAutofit/>
+            <a:normAutofit fontScale="77500" lnSpcReduction="20000"/>
           </a:bodyPr>
           <a:lstStyle/>
           <a:p>
@@ -6334,7 +6352,51 @@
                   <a:schemeClr val="tx1"/>
                 </a:solidFill>
               </a:rPr>
-              <a:t>Nothing</a:t>
+              <a:t>Python render backend</a:t>
+            </a:r>
+          </a:p>
+          <a:p>
+            <a:pPr lvl="1"/>
+            <a:r>
+              <a:rPr lang="en-US" dirty="0">
+                <a:solidFill>
+                  <a:schemeClr val="tx1"/>
+                </a:solidFill>
+              </a:rPr>
+              <a:t>Compiling, loading and material creation for custom OSL shaders</a:t>
+            </a:r>
+          </a:p>
+          <a:p>
+            <a:pPr lvl="1"/>
+            <a:r>
+              <a:rPr lang="en-US" dirty="0">
+                <a:solidFill>
+                  <a:schemeClr val="tx1"/>
+                </a:solidFill>
+              </a:rPr>
+              <a:t>Converting, loading and binding of textures</a:t>
+            </a:r>
+          </a:p>
+          <a:p>
+            <a:pPr lvl="1"/>
+            <a:r>
+              <a:rPr lang="en-US" dirty="0">
+                <a:solidFill>
+                  <a:schemeClr val="tx1"/>
+                </a:solidFill>
+              </a:rPr>
+              <a:t>Custom renderfile format for effective scene creation &amp; translation</a:t>
+            </a:r>
+          </a:p>
+          <a:p>
+            <a:pPr lvl="1"/>
+            <a:r>
+              <a:rPr lang="en-US" dirty="0">
+                <a:solidFill>
+                  <a:schemeClr val="tx1"/>
+                </a:solidFill>
+              </a:rPr>
+              <a:t>Object creation, instancing &amp; lifetime handling</a:t>
             </a:r>
           </a:p>
           <a:p>
@@ -6368,17 +6430,6 @@
                   <a:schemeClr val="tx1"/>
                 </a:solidFill>
               </a:rPr>
-              <a:t>Compiling, loading and material creation for custom OSL shaders</a:t>
-            </a:r>
-          </a:p>
-          <a:p>
-            <a:pPr lvl="1"/>
-            <a:r>
-              <a:rPr lang="en-US" dirty="0">
-                <a:solidFill>
-                  <a:schemeClr val="tx1"/>
-                </a:solidFill>
-              </a:rPr>
               <a:t>Recreation of Arnold shaders in OSL</a:t>
             </a:r>
           </a:p>
@@ -6400,7 +6451,18 @@
                   <a:schemeClr val="tx1"/>
                 </a:solidFill>
               </a:rPr>
-              <a:t>Completion of C++ to Python bridge and render data transfer</a:t>
+              <a:t>Creation of renderfile from existing classes &amp; data in C++</a:t>
+            </a:r>
+          </a:p>
+          <a:p>
+            <a:pPr lvl="1"/>
+            <a:r>
+              <a:rPr lang="en-US" dirty="0">
+                <a:solidFill>
+                  <a:schemeClr val="tx1"/>
+                </a:solidFill>
+              </a:rPr>
+              <a:t>Transport of renderfile from C++ to Python module</a:t>
             </a:r>
           </a:p>
         </p:txBody>

</xml_diff>

<commit_message>
Removed clipping plane params
- Removed clipping planes as they are obsolete
- Replaced far clip with scene dims magnitude for human readable depth output
- Updated renderfile & python accordingly
- Updated status pptx
</commit_message>
<xml_diff>
--- a/doc/Status.pptx
+++ b/doc/Status.pptx
@@ -307,7 +307,7 @@
             <a:fld id="{B61BEF0D-F0BB-DE4B-95CE-6DB70DBA9567}" type="datetimeFigureOut">
               <a:rPr lang="en-US" dirty="0"/>
               <a:pPr/>
-              <a:t>7/7/2020</a:t>
+              <a:t>8/21/2020</a:t>
             </a:fld>
             <a:endParaRPr lang="en-US" dirty="0"/>
           </a:p>
@@ -740,7 +740,7 @@
             <a:fld id="{B61BEF0D-F0BB-DE4B-95CE-6DB70DBA9567}" type="datetimeFigureOut">
               <a:rPr lang="en-US" dirty="0"/>
               <a:pPr/>
-              <a:t>7/7/2020</a:t>
+              <a:t>8/21/2020</a:t>
             </a:fld>
             <a:endParaRPr lang="en-US" dirty="0"/>
           </a:p>
@@ -987,7 +987,7 @@
             <a:fld id="{B61BEF0D-F0BB-DE4B-95CE-6DB70DBA9567}" type="datetimeFigureOut">
               <a:rPr lang="en-US" dirty="0"/>
               <a:pPr/>
-              <a:t>7/7/2020</a:t>
+              <a:t>8/21/2020</a:t>
             </a:fld>
             <a:endParaRPr lang="en-US" dirty="0"/>
           </a:p>
@@ -1292,7 +1292,7 @@
             <a:fld id="{B61BEF0D-F0BB-DE4B-95CE-6DB70DBA9567}" type="datetimeFigureOut">
               <a:rPr lang="en-US" dirty="0"/>
               <a:pPr/>
-              <a:t>7/7/2020</a:t>
+              <a:t>8/21/2020</a:t>
             </a:fld>
             <a:endParaRPr lang="en-US" dirty="0"/>
           </a:p>
@@ -1607,7 +1607,7 @@
             <a:fld id="{B61BEF0D-F0BB-DE4B-95CE-6DB70DBA9567}" type="datetimeFigureOut">
               <a:rPr lang="en-US" dirty="0"/>
               <a:pPr/>
-              <a:t>7/7/2020</a:t>
+              <a:t>8/21/2020</a:t>
             </a:fld>
             <a:endParaRPr lang="en-US" dirty="0"/>
           </a:p>
@@ -1906,7 +1906,7 @@
             <a:fld id="{B61BEF0D-F0BB-DE4B-95CE-6DB70DBA9567}" type="datetimeFigureOut">
               <a:rPr lang="en-US" dirty="0"/>
               <a:pPr/>
-              <a:t>7/7/2020</a:t>
+              <a:t>8/21/2020</a:t>
             </a:fld>
             <a:endParaRPr lang="en-US" dirty="0"/>
           </a:p>
@@ -2270,7 +2270,7 @@
             <a:fld id="{B61BEF0D-F0BB-DE4B-95CE-6DB70DBA9567}" type="datetimeFigureOut">
               <a:rPr lang="en-US" dirty="0"/>
               <a:pPr/>
-              <a:t>7/7/2020</a:t>
+              <a:t>8/21/2020</a:t>
             </a:fld>
             <a:endParaRPr lang="en-US" dirty="0"/>
           </a:p>
@@ -2441,7 +2441,7 @@
             <a:fld id="{B61BEF0D-F0BB-DE4B-95CE-6DB70DBA9567}" type="datetimeFigureOut">
               <a:rPr lang="en-US" dirty="0"/>
               <a:pPr/>
-              <a:t>7/7/2020</a:t>
+              <a:t>8/21/2020</a:t>
             </a:fld>
             <a:endParaRPr lang="en-US" dirty="0"/>
           </a:p>
@@ -2618,7 +2618,7 @@
             <a:fld id="{B61BEF0D-F0BB-DE4B-95CE-6DB70DBA9567}" type="datetimeFigureOut">
               <a:rPr lang="en-US" dirty="0"/>
               <a:pPr/>
-              <a:t>7/7/2020</a:t>
+              <a:t>8/21/2020</a:t>
             </a:fld>
             <a:endParaRPr lang="en-US" dirty="0"/>
           </a:p>
@@ -2785,7 +2785,7 @@
             <a:fld id="{B61BEF0D-F0BB-DE4B-95CE-6DB70DBA9567}" type="datetimeFigureOut">
               <a:rPr lang="en-US" dirty="0"/>
               <a:pPr/>
-              <a:t>7/7/2020</a:t>
+              <a:t>8/21/2020</a:t>
             </a:fld>
             <a:endParaRPr lang="en-US" dirty="0"/>
           </a:p>
@@ -3032,7 +3032,7 @@
             <a:fld id="{B61BEF0D-F0BB-DE4B-95CE-6DB70DBA9567}" type="datetimeFigureOut">
               <a:rPr lang="en-US" dirty="0"/>
               <a:pPr/>
-              <a:t>7/7/2020</a:t>
+              <a:t>8/21/2020</a:t>
             </a:fld>
             <a:endParaRPr lang="en-US" dirty="0"/>
           </a:p>
@@ -3265,7 +3265,7 @@
             <a:fld id="{B61BEF0D-F0BB-DE4B-95CE-6DB70DBA9567}" type="datetimeFigureOut">
               <a:rPr lang="en-US" dirty="0"/>
               <a:pPr/>
-              <a:t>7/7/2020</a:t>
+              <a:t>8/21/2020</a:t>
             </a:fld>
             <a:endParaRPr lang="en-US" dirty="0"/>
           </a:p>
@@ -3644,7 +3644,7 @@
             <a:fld id="{B61BEF0D-F0BB-DE4B-95CE-6DB70DBA9567}" type="datetimeFigureOut">
               <a:rPr lang="en-US" dirty="0"/>
               <a:pPr/>
-              <a:t>7/7/2020</a:t>
+              <a:t>8/21/2020</a:t>
             </a:fld>
             <a:endParaRPr lang="en-US" dirty="0"/>
           </a:p>
@@ -3759,7 +3759,7 @@
             <a:fld id="{B61BEF0D-F0BB-DE4B-95CE-6DB70DBA9567}" type="datetimeFigureOut">
               <a:rPr lang="en-US" dirty="0"/>
               <a:pPr/>
-              <a:t>7/7/2020</a:t>
+              <a:t>8/21/2020</a:t>
             </a:fld>
             <a:endParaRPr lang="en-US" dirty="0"/>
           </a:p>
@@ -3851,7 +3851,7 @@
             <a:fld id="{B61BEF0D-F0BB-DE4B-95CE-6DB70DBA9567}" type="datetimeFigureOut">
               <a:rPr lang="en-US" dirty="0"/>
               <a:pPr/>
-              <a:t>7/7/2020</a:t>
+              <a:t>8/21/2020</a:t>
             </a:fld>
             <a:endParaRPr lang="en-US" dirty="0"/>
           </a:p>
@@ -4103,7 +4103,7 @@
             <a:fld id="{B61BEF0D-F0BB-DE4B-95CE-6DB70DBA9567}" type="datetimeFigureOut">
               <a:rPr lang="en-US" dirty="0"/>
               <a:pPr/>
-              <a:t>7/7/2020</a:t>
+              <a:t>8/21/2020</a:t>
             </a:fld>
             <a:endParaRPr lang="en-US" dirty="0"/>
           </a:p>
@@ -4383,7 +4383,7 @@
             <a:fld id="{B61BEF0D-F0BB-DE4B-95CE-6DB70DBA9567}" type="datetimeFigureOut">
               <a:rPr lang="en-US" dirty="0"/>
               <a:pPr/>
-              <a:t>7/7/2020</a:t>
+              <a:t>8/21/2020</a:t>
             </a:fld>
             <a:endParaRPr lang="en-US" dirty="0"/>
           </a:p>
@@ -4786,7 +4786,7 @@
             <a:fld id="{B61BEF0D-F0BB-DE4B-95CE-6DB70DBA9567}" type="datetimeFigureOut">
               <a:rPr lang="en-US" dirty="0"/>
               <a:pPr/>
-              <a:t>7/7/2020</a:t>
+              <a:t>8/21/2020</a:t>
             </a:fld>
             <a:endParaRPr lang="en-US" dirty="0"/>
           </a:p>
@@ -5822,8 +5822,40 @@
                   <a:schemeClr val="tx1"/>
                 </a:solidFill>
               </a:rPr>
-              <a:t>Multithreaded rendering</a:t>
-            </a:r>
+              <a:t>Process based multithreaded &amp; batched rendering</a:t>
+            </a:r>
+          </a:p>
+          <a:p>
+            <a:pPr lvl="1"/>
+            <a:r>
+              <a:rPr lang="en-US" dirty="0" err="1">
+                <a:solidFill>
+                  <a:schemeClr val="tx1"/>
+                </a:solidFill>
+              </a:rPr>
+              <a:t>Renderfile</a:t>
+            </a:r>
+            <a:r>
+              <a:rPr lang="en-US" dirty="0">
+                <a:solidFill>
+                  <a:schemeClr val="tx1"/>
+                </a:solidFill>
+              </a:rPr>
+              <a:t> updating to prevent </a:t>
+            </a:r>
+            <a:r>
+              <a:rPr lang="en-US">
+                <a:solidFill>
+                  <a:schemeClr val="tx1"/>
+                </a:solidFill>
+              </a:rPr>
+              <a:t>reload performance hit</a:t>
+            </a:r>
+            <a:endParaRPr lang="en-US" dirty="0">
+              <a:solidFill>
+                <a:schemeClr val="tx1"/>
+              </a:solidFill>
+            </a:endParaRPr>
           </a:p>
           <a:p>
             <a:r>
@@ -6329,7 +6361,7 @@
         </p:spPr>
         <p:txBody>
           <a:bodyPr>
-            <a:normAutofit fontScale="77500" lnSpcReduction="20000"/>
+            <a:normAutofit fontScale="62500" lnSpcReduction="20000"/>
           </a:bodyPr>
           <a:lstStyle/>
           <a:p>
@@ -6400,6 +6432,49 @@
             </a:r>
           </a:p>
           <a:p>
+            <a:pPr lvl="1"/>
+            <a:r>
+              <a:rPr lang="en-US" dirty="0">
+                <a:solidFill>
+                  <a:schemeClr val="tx1"/>
+                </a:solidFill>
+              </a:rPr>
+              <a:t>Recreation of Arnold shaders in OSL</a:t>
+            </a:r>
+          </a:p>
+          <a:p>
+            <a:r>
+              <a:rPr lang="en-US" dirty="0">
+                <a:solidFill>
+                  <a:schemeClr val="tx1"/>
+                </a:solidFill>
+              </a:rPr>
+              <a:t>C++ Boost::Python</a:t>
+            </a:r>
+          </a:p>
+          <a:p>
+            <a:pPr lvl="1"/>
+            <a:r>
+              <a:rPr lang="en-US" dirty="0">
+                <a:solidFill>
+                  <a:schemeClr val="tx1"/>
+                </a:solidFill>
+              </a:rPr>
+              <a:t>Creation of renderfile from existing classes &amp; data in C++</a:t>
+            </a:r>
+          </a:p>
+          <a:p>
+            <a:pPr lvl="1"/>
+            <a:r>
+              <a:rPr lang="en-US" dirty="0">
+                <a:solidFill>
+                  <a:schemeClr val="tx1"/>
+                </a:solidFill>
+              </a:rPr>
+              <a:t>Transport of renderfile from C++ to Python module</a:t>
+            </a:r>
+          </a:p>
+          <a:p>
             <a:pPr marL="0" indent="0">
               <a:buNone/>
             </a:pPr>
@@ -6419,7 +6494,7 @@
                   <a:schemeClr val="tx1"/>
                 </a:solidFill>
               </a:rPr>
-              <a:t>Python render backend</a:t>
+              <a:t>Python &amp; C++</a:t>
             </a:r>
           </a:p>
           <a:p>
@@ -6430,39 +6505,18 @@
                   <a:schemeClr val="tx1"/>
                 </a:solidFill>
               </a:rPr>
-              <a:t>Recreation of Arnold shaders in OSL</a:t>
-            </a:r>
-          </a:p>
-          <a:p>
+              <a:t>Improved lighting by including scene for indirect light / shadows</a:t>
+            </a:r>
+          </a:p>
+          <a:p>
+            <a:pPr lvl="1"/>
             <a:r>
               <a:rPr lang="en-US" dirty="0">
                 <a:solidFill>
                   <a:schemeClr val="tx1"/>
                 </a:solidFill>
               </a:rPr>
-              <a:t>C++ Boost::Python</a:t>
-            </a:r>
-          </a:p>
-          <a:p>
-            <a:pPr lvl="1"/>
-            <a:r>
-              <a:rPr lang="en-US" dirty="0">
-                <a:solidFill>
-                  <a:schemeClr val="tx1"/>
-                </a:solidFill>
-              </a:rPr>
-              <a:t>Creation of renderfile from existing classes &amp; data in C++</a:t>
-            </a:r>
-          </a:p>
-          <a:p>
-            <a:pPr lvl="1"/>
-            <a:r>
-              <a:rPr lang="en-US" dirty="0">
-                <a:solidFill>
-                  <a:schemeClr val="tx1"/>
-                </a:solidFill>
-              </a:rPr>
-              <a:t>Transport of renderfile from C++ to Python module</a:t>
+              <a:t>Ambient occlusion pass for objects for better contact shadows</a:t>
             </a:r>
           </a:p>
         </p:txBody>
@@ -6960,7 +7014,7 @@
                   <a:schemeClr val="tx1"/>
                 </a:solidFill>
               </a:rPr>
-              <a:t>Automatic Blender &amp; Appleseed download, build &amp; install</a:t>
+              <a:t>Automatic Blender &amp; Appleseed download &amp; copy</a:t>
             </a:r>
           </a:p>
           <a:p>
@@ -6970,7 +7024,7 @@
                   <a:schemeClr val="tx1"/>
                 </a:solidFill>
               </a:rPr>
-              <a:t>Automatic copying of Python scripts &amp; package</a:t>
+              <a:t>Automatic copying of Python module</a:t>
             </a:r>
           </a:p>
         </p:txBody>
@@ -7446,6 +7500,42 @@
                 </a:solidFill>
               </a:rPr>
               <a:t>Extended documentation</a:t>
+            </a:r>
+          </a:p>
+          <a:p>
+            <a:r>
+              <a:rPr lang="en-US" dirty="0">
+                <a:solidFill>
+                  <a:schemeClr val="tx1"/>
+                </a:solidFill>
+              </a:rPr>
+              <a:t>PhysX GPU </a:t>
+            </a:r>
+            <a:r>
+              <a:rPr lang="en-US" dirty="0" err="1">
+                <a:solidFill>
+                  <a:schemeClr val="tx1"/>
+                </a:solidFill>
+              </a:rPr>
+              <a:t>rigidbodies</a:t>
+            </a:r>
+            <a:r>
+              <a:rPr lang="en-US" dirty="0">
+                <a:solidFill>
+                  <a:schemeClr val="tx1"/>
+                </a:solidFill>
+              </a:rPr>
+              <a:t> &amp; CCD</a:t>
+            </a:r>
+          </a:p>
+          <a:p>
+            <a:r>
+              <a:rPr lang="en-US" dirty="0">
+                <a:solidFill>
+                  <a:schemeClr val="tx1"/>
+                </a:solidFill>
+              </a:rPr>
+              <a:t>Improved performance &amp; stability</a:t>
             </a:r>
           </a:p>
           <a:p>

</xml_diff>